<commit_message>
Lab2 Mon Jun 10 08:16:18 CEST 2024
</commit_message>
<xml_diff>
--- a/Report/overview.pptx
+++ b/Report/overview.pptx
@@ -104,6 +104,11 @@
       </a:defRPr>
     </a:lvl9pPr>
   </p:defaultTextStyle>
+  <p:extLst>
+    <p:ext uri="{EFAFB233-063F-42B5-8137-9DF3F51BA10A}">
+      <p15:sldGuideLst xmlns:p15="http://schemas.microsoft.com/office/powerpoint/2012/main"/>
+    </p:ext>
+  </p:extLst>
 </p:presentation>
 </file>
 
@@ -256,7 +261,7 @@
           <a:p>
             <a:fld id="{6CA3C4A9-1E75-E24C-A3C7-8ACEDA2B8F42}" type="datetimeFigureOut">
               <a:rPr lang="en-US" smtClean="0"/>
-              <a:t>6/8/24</a:t>
+              <a:t>6/10/24</a:t>
             </a:fld>
             <a:endParaRPr lang="en-US"/>
           </a:p>
@@ -456,7 +461,7 @@
           <a:p>
             <a:fld id="{6CA3C4A9-1E75-E24C-A3C7-8ACEDA2B8F42}" type="datetimeFigureOut">
               <a:rPr lang="en-US" smtClean="0"/>
-              <a:t>6/8/24</a:t>
+              <a:t>6/10/24</a:t>
             </a:fld>
             <a:endParaRPr lang="en-US"/>
           </a:p>
@@ -666,7 +671,7 @@
           <a:p>
             <a:fld id="{6CA3C4A9-1E75-E24C-A3C7-8ACEDA2B8F42}" type="datetimeFigureOut">
               <a:rPr lang="en-US" smtClean="0"/>
-              <a:t>6/8/24</a:t>
+              <a:t>6/10/24</a:t>
             </a:fld>
             <a:endParaRPr lang="en-US"/>
           </a:p>
@@ -866,7 +871,7 @@
           <a:p>
             <a:fld id="{6CA3C4A9-1E75-E24C-A3C7-8ACEDA2B8F42}" type="datetimeFigureOut">
               <a:rPr lang="en-US" smtClean="0"/>
-              <a:t>6/8/24</a:t>
+              <a:t>6/10/24</a:t>
             </a:fld>
             <a:endParaRPr lang="en-US"/>
           </a:p>
@@ -1142,7 +1147,7 @@
           <a:p>
             <a:fld id="{6CA3C4A9-1E75-E24C-A3C7-8ACEDA2B8F42}" type="datetimeFigureOut">
               <a:rPr lang="en-US" smtClean="0"/>
-              <a:t>6/8/24</a:t>
+              <a:t>6/10/24</a:t>
             </a:fld>
             <a:endParaRPr lang="en-US"/>
           </a:p>
@@ -1410,7 +1415,7 @@
           <a:p>
             <a:fld id="{6CA3C4A9-1E75-E24C-A3C7-8ACEDA2B8F42}" type="datetimeFigureOut">
               <a:rPr lang="en-US" smtClean="0"/>
-              <a:t>6/8/24</a:t>
+              <a:t>6/10/24</a:t>
             </a:fld>
             <a:endParaRPr lang="en-US"/>
           </a:p>
@@ -1825,7 +1830,7 @@
           <a:p>
             <a:fld id="{6CA3C4A9-1E75-E24C-A3C7-8ACEDA2B8F42}" type="datetimeFigureOut">
               <a:rPr lang="en-US" smtClean="0"/>
-              <a:t>6/8/24</a:t>
+              <a:t>6/10/24</a:t>
             </a:fld>
             <a:endParaRPr lang="en-US"/>
           </a:p>
@@ -1967,7 +1972,7 @@
           <a:p>
             <a:fld id="{6CA3C4A9-1E75-E24C-A3C7-8ACEDA2B8F42}" type="datetimeFigureOut">
               <a:rPr lang="en-US" smtClean="0"/>
-              <a:t>6/8/24</a:t>
+              <a:t>6/10/24</a:t>
             </a:fld>
             <a:endParaRPr lang="en-US"/>
           </a:p>
@@ -2080,7 +2085,7 @@
           <a:p>
             <a:fld id="{6CA3C4A9-1E75-E24C-A3C7-8ACEDA2B8F42}" type="datetimeFigureOut">
               <a:rPr lang="en-US" smtClean="0"/>
-              <a:t>6/8/24</a:t>
+              <a:t>6/10/24</a:t>
             </a:fld>
             <a:endParaRPr lang="en-US"/>
           </a:p>
@@ -2393,7 +2398,7 @@
           <a:p>
             <a:fld id="{6CA3C4A9-1E75-E24C-A3C7-8ACEDA2B8F42}" type="datetimeFigureOut">
               <a:rPr lang="en-US" smtClean="0"/>
-              <a:t>6/8/24</a:t>
+              <a:t>6/10/24</a:t>
             </a:fld>
             <a:endParaRPr lang="en-US"/>
           </a:p>
@@ -2682,7 +2687,7 @@
           <a:p>
             <a:fld id="{6CA3C4A9-1E75-E24C-A3C7-8ACEDA2B8F42}" type="datetimeFigureOut">
               <a:rPr lang="en-US" smtClean="0"/>
-              <a:t>6/8/24</a:t>
+              <a:t>6/10/24</a:t>
             </a:fld>
             <a:endParaRPr lang="en-US"/>
           </a:p>
@@ -2925,7 +2930,7 @@
           <a:p>
             <a:fld id="{6CA3C4A9-1E75-E24C-A3C7-8ACEDA2B8F42}" type="datetimeFigureOut">
               <a:rPr lang="en-US" smtClean="0"/>
-              <a:t>6/8/24</a:t>
+              <a:t>6/10/24</a:t>
             </a:fld>
             <a:endParaRPr lang="en-US"/>
           </a:p>
@@ -4869,8 +4874,8 @@
           <p:nvPr/>
         </p:nvSpPr>
         <p:spPr>
-          <a:xfrm rot="10800000">
-            <a:off x="477078" y="4575248"/>
+          <a:xfrm rot="5400000">
+            <a:off x="6792326" y="5763779"/>
             <a:ext cx="1225409" cy="360680"/>
           </a:xfrm>
           <a:prstGeom prst="rightArrow">
@@ -4928,7 +4933,7 @@
         </p:nvSpPr>
         <p:spPr>
           <a:xfrm>
-            <a:off x="316039" y="4321391"/>
+            <a:off x="5883564" y="5665872"/>
             <a:ext cx="1695128" cy="277449"/>
           </a:xfrm>
           <a:prstGeom prst="rect">
@@ -4968,6 +4973,222 @@
               </a:rPr>
               <a:t>Is done?</a:t>
             </a:r>
+          </a:p>
+        </p:txBody>
+      </p:sp>
+      <p:sp>
+        <p:nvSpPr>
+          <p:cNvPr id="3" name="Rectangle 2">
+            <a:extLst>
+              <a:ext uri="{FF2B5EF4-FFF2-40B4-BE49-F238E27FC236}">
+                <a16:creationId xmlns:a16="http://schemas.microsoft.com/office/drawing/2014/main" id="{4CECE0C6-B5FE-5530-30EA-35F7499A0326}"/>
+              </a:ext>
+            </a:extLst>
+          </p:cNvPr>
+          <p:cNvSpPr/>
+          <p:nvPr/>
+        </p:nvSpPr>
+        <p:spPr>
+          <a:xfrm rot="16200000">
+            <a:off x="7142790" y="3946946"/>
+            <a:ext cx="536175" cy="248192"/>
+          </a:xfrm>
+          <a:prstGeom prst="rect">
+            <a:avLst/>
+          </a:prstGeom>
+          <a:solidFill>
+            <a:schemeClr val="bg1"/>
+          </a:solidFill>
+          <a:ln>
+            <a:solidFill>
+              <a:schemeClr val="tx1"/>
+            </a:solidFill>
+          </a:ln>
+        </p:spPr>
+        <p:style>
+          <a:lnRef idx="2">
+            <a:schemeClr val="accent1">
+              <a:shade val="15000"/>
+            </a:schemeClr>
+          </a:lnRef>
+          <a:fillRef idx="1">
+            <a:schemeClr val="accent1"/>
+          </a:fillRef>
+          <a:effectRef idx="0">
+            <a:schemeClr val="accent1"/>
+          </a:effectRef>
+          <a:fontRef idx="minor">
+            <a:schemeClr val="lt1"/>
+          </a:fontRef>
+        </p:style>
+        <p:txBody>
+          <a:bodyPr rtlCol="0" anchor="ctr"/>
+          <a:lstStyle/>
+          <a:p>
+            <a:pPr algn="ctr"/>
+            <a:endParaRPr lang="en-US"/>
+          </a:p>
+        </p:txBody>
+      </p:sp>
+      <p:sp>
+        <p:nvSpPr>
+          <p:cNvPr id="14" name="Rectangle 13">
+            <a:extLst>
+              <a:ext uri="{FF2B5EF4-FFF2-40B4-BE49-F238E27FC236}">
+                <a16:creationId xmlns:a16="http://schemas.microsoft.com/office/drawing/2014/main" id="{21F5EB5F-4726-34C6-C321-24F3954200FB}"/>
+              </a:ext>
+            </a:extLst>
+          </p:cNvPr>
+          <p:cNvSpPr/>
+          <p:nvPr/>
+        </p:nvSpPr>
+        <p:spPr>
+          <a:xfrm>
+            <a:off x="7036934" y="4281225"/>
+            <a:ext cx="736983" cy="116731"/>
+          </a:xfrm>
+          <a:prstGeom prst="rect">
+            <a:avLst/>
+          </a:prstGeom>
+          <a:solidFill>
+            <a:schemeClr val="bg1"/>
+          </a:solidFill>
+          <a:ln>
+            <a:solidFill>
+              <a:schemeClr val="tx1"/>
+            </a:solidFill>
+          </a:ln>
+        </p:spPr>
+        <p:style>
+          <a:lnRef idx="2">
+            <a:schemeClr val="accent1">
+              <a:shade val="15000"/>
+            </a:schemeClr>
+          </a:lnRef>
+          <a:fillRef idx="1">
+            <a:schemeClr val="accent1"/>
+          </a:fillRef>
+          <a:effectRef idx="0">
+            <a:schemeClr val="accent1"/>
+          </a:effectRef>
+          <a:fontRef idx="minor">
+            <a:schemeClr val="lt1"/>
+          </a:fontRef>
+        </p:style>
+        <p:txBody>
+          <a:bodyPr rtlCol="0" anchor="ctr"/>
+          <a:lstStyle/>
+          <a:p>
+            <a:pPr algn="ctr"/>
+            <a:endParaRPr lang="en-US"/>
+          </a:p>
+        </p:txBody>
+      </p:sp>
+      <p:sp>
+        <p:nvSpPr>
+          <p:cNvPr id="18" name="Rectangle 17">
+            <a:extLst>
+              <a:ext uri="{FF2B5EF4-FFF2-40B4-BE49-F238E27FC236}">
+                <a16:creationId xmlns:a16="http://schemas.microsoft.com/office/drawing/2014/main" id="{2CF0AEBC-8D2E-B754-62BA-4C7356FA83EA}"/>
+              </a:ext>
+            </a:extLst>
+          </p:cNvPr>
+          <p:cNvSpPr/>
+          <p:nvPr/>
+        </p:nvSpPr>
+        <p:spPr>
+          <a:xfrm>
+            <a:off x="1763673" y="3442275"/>
+            <a:ext cx="736983" cy="116731"/>
+          </a:xfrm>
+          <a:prstGeom prst="rect">
+            <a:avLst/>
+          </a:prstGeom>
+          <a:solidFill>
+            <a:schemeClr val="bg1"/>
+          </a:solidFill>
+          <a:ln>
+            <a:solidFill>
+              <a:schemeClr val="tx1"/>
+            </a:solidFill>
+          </a:ln>
+        </p:spPr>
+        <p:style>
+          <a:lnRef idx="2">
+            <a:schemeClr val="accent1">
+              <a:shade val="15000"/>
+            </a:schemeClr>
+          </a:lnRef>
+          <a:fillRef idx="1">
+            <a:schemeClr val="accent1"/>
+          </a:fillRef>
+          <a:effectRef idx="0">
+            <a:schemeClr val="accent1"/>
+          </a:effectRef>
+          <a:fontRef idx="minor">
+            <a:schemeClr val="lt1"/>
+          </a:fontRef>
+        </p:style>
+        <p:txBody>
+          <a:bodyPr rtlCol="0" anchor="ctr"/>
+          <a:lstStyle/>
+          <a:p>
+            <a:pPr algn="ctr"/>
+            <a:endParaRPr lang="en-US"/>
+          </a:p>
+        </p:txBody>
+      </p:sp>
+      <p:sp>
+        <p:nvSpPr>
+          <p:cNvPr id="19" name="Rectangle 18">
+            <a:extLst>
+              <a:ext uri="{FF2B5EF4-FFF2-40B4-BE49-F238E27FC236}">
+                <a16:creationId xmlns:a16="http://schemas.microsoft.com/office/drawing/2014/main" id="{C7069E50-F9AD-436B-1818-64A665BB94BD}"/>
+              </a:ext>
+            </a:extLst>
+          </p:cNvPr>
+          <p:cNvSpPr/>
+          <p:nvPr/>
+        </p:nvSpPr>
+        <p:spPr>
+          <a:xfrm>
+            <a:off x="7036538" y="5267511"/>
+            <a:ext cx="736983" cy="116731"/>
+          </a:xfrm>
+          <a:prstGeom prst="rect">
+            <a:avLst/>
+          </a:prstGeom>
+          <a:solidFill>
+            <a:schemeClr val="bg1"/>
+          </a:solidFill>
+          <a:ln>
+            <a:solidFill>
+              <a:schemeClr val="tx1"/>
+            </a:solidFill>
+          </a:ln>
+        </p:spPr>
+        <p:style>
+          <a:lnRef idx="2">
+            <a:schemeClr val="accent1">
+              <a:shade val="15000"/>
+            </a:schemeClr>
+          </a:lnRef>
+          <a:fillRef idx="1">
+            <a:schemeClr val="accent1"/>
+          </a:fillRef>
+          <a:effectRef idx="0">
+            <a:schemeClr val="accent1"/>
+          </a:effectRef>
+          <a:fontRef idx="minor">
+            <a:schemeClr val="lt1"/>
+          </a:fontRef>
+        </p:style>
+        <p:txBody>
+          <a:bodyPr rtlCol="0" anchor="ctr"/>
+          <a:lstStyle/>
+          <a:p>
+            <a:pPr algn="ctr"/>
+            <a:endParaRPr lang="en-US"/>
           </a:p>
         </p:txBody>
       </p:sp>

</xml_diff>

<commit_message>
Lab2 Tue Jun 11 17:36:38 CEST 2024
</commit_message>
<xml_diff>
--- a/Report/overview.pptx
+++ b/Report/overview.pptx
@@ -5045,60 +5045,6 @@
         <p:spPr>
           <a:xfrm>
             <a:off x="7036934" y="4281225"/>
-            <a:ext cx="736983" cy="116731"/>
-          </a:xfrm>
-          <a:prstGeom prst="rect">
-            <a:avLst/>
-          </a:prstGeom>
-          <a:solidFill>
-            <a:schemeClr val="bg1"/>
-          </a:solidFill>
-          <a:ln>
-            <a:solidFill>
-              <a:schemeClr val="tx1"/>
-            </a:solidFill>
-          </a:ln>
-        </p:spPr>
-        <p:style>
-          <a:lnRef idx="2">
-            <a:schemeClr val="accent1">
-              <a:shade val="15000"/>
-            </a:schemeClr>
-          </a:lnRef>
-          <a:fillRef idx="1">
-            <a:schemeClr val="accent1"/>
-          </a:fillRef>
-          <a:effectRef idx="0">
-            <a:schemeClr val="accent1"/>
-          </a:effectRef>
-          <a:fontRef idx="minor">
-            <a:schemeClr val="lt1"/>
-          </a:fontRef>
-        </p:style>
-        <p:txBody>
-          <a:bodyPr rtlCol="0" anchor="ctr"/>
-          <a:lstStyle/>
-          <a:p>
-            <a:pPr algn="ctr"/>
-            <a:endParaRPr lang="en-US"/>
-          </a:p>
-        </p:txBody>
-      </p:sp>
-      <p:sp>
-        <p:nvSpPr>
-          <p:cNvPr id="18" name="Rectangle 17">
-            <a:extLst>
-              <a:ext uri="{FF2B5EF4-FFF2-40B4-BE49-F238E27FC236}">
-                <a16:creationId xmlns:a16="http://schemas.microsoft.com/office/drawing/2014/main" id="{2CF0AEBC-8D2E-B754-62BA-4C7356FA83EA}"/>
-              </a:ext>
-            </a:extLst>
-          </p:cNvPr>
-          <p:cNvSpPr/>
-          <p:nvPr/>
-        </p:nvSpPr>
-        <p:spPr>
-          <a:xfrm>
-            <a:off x="1763673" y="3442275"/>
             <a:ext cx="736983" cy="116731"/>
           </a:xfrm>
           <a:prstGeom prst="rect">

</xml_diff>